<commit_message>
220716 SW: Springboot with React Updated
</commit_message>
<xml_diff>
--- a/02_SpringBoot_with_React/img.pptx
+++ b/02_SpringBoot_with_React/img.pptx
@@ -6,6 +6,7 @@
   </p:sldMasterIdLst>
   <p:sldIdLst>
     <p:sldId id="256" r:id="rId2"/>
+    <p:sldId id="257" r:id="rId3"/>
   </p:sldIdLst>
   <p:sldSz cx="12192000" cy="6858000"/>
   <p:notesSz cx="6858000" cy="9144000"/>
@@ -104,6 +105,11 @@
       </a:defRPr>
     </a:lvl9pPr>
   </p:defaultTextStyle>
+  <p:extLst>
+    <p:ext uri="{EFAFB233-063F-42B5-8137-9DF3F51BA10A}">
+      <p15:sldGuideLst xmlns:p15="http://schemas.microsoft.com/office/powerpoint/2012/main"/>
+    </p:ext>
+  </p:extLst>
 </p:presentation>
 </file>
 
@@ -238,7 +244,7 @@
           <a:p>
             <a:fld id="{ACA11FE2-C26E-405E-886C-CB2CCA1798DD}" type="datetimeFigureOut">
               <a:rPr lang="ko-KR" altLang="en-US" smtClean="0"/>
-              <a:t>2022-07-01</a:t>
+              <a:t>2022-07-16</a:t>
             </a:fld>
             <a:endParaRPr lang="ko-KR" altLang="en-US"/>
           </a:p>
@@ -408,7 +414,7 @@
           <a:p>
             <a:fld id="{ACA11FE2-C26E-405E-886C-CB2CCA1798DD}" type="datetimeFigureOut">
               <a:rPr lang="ko-KR" altLang="en-US" smtClean="0"/>
-              <a:t>2022-07-01</a:t>
+              <a:t>2022-07-16</a:t>
             </a:fld>
             <a:endParaRPr lang="ko-KR" altLang="en-US"/>
           </a:p>
@@ -588,7 +594,7 @@
           <a:p>
             <a:fld id="{ACA11FE2-C26E-405E-886C-CB2CCA1798DD}" type="datetimeFigureOut">
               <a:rPr lang="ko-KR" altLang="en-US" smtClean="0"/>
-              <a:t>2022-07-01</a:t>
+              <a:t>2022-07-16</a:t>
             </a:fld>
             <a:endParaRPr lang="ko-KR" altLang="en-US"/>
           </a:p>
@@ -758,7 +764,7 @@
           <a:p>
             <a:fld id="{ACA11FE2-C26E-405E-886C-CB2CCA1798DD}" type="datetimeFigureOut">
               <a:rPr lang="ko-KR" altLang="en-US" smtClean="0"/>
-              <a:t>2022-07-01</a:t>
+              <a:t>2022-07-16</a:t>
             </a:fld>
             <a:endParaRPr lang="ko-KR" altLang="en-US"/>
           </a:p>
@@ -1004,7 +1010,7 @@
           <a:p>
             <a:fld id="{ACA11FE2-C26E-405E-886C-CB2CCA1798DD}" type="datetimeFigureOut">
               <a:rPr lang="ko-KR" altLang="en-US" smtClean="0"/>
-              <a:t>2022-07-01</a:t>
+              <a:t>2022-07-16</a:t>
             </a:fld>
             <a:endParaRPr lang="ko-KR" altLang="en-US"/>
           </a:p>
@@ -1236,7 +1242,7 @@
           <a:p>
             <a:fld id="{ACA11FE2-C26E-405E-886C-CB2CCA1798DD}" type="datetimeFigureOut">
               <a:rPr lang="ko-KR" altLang="en-US" smtClean="0"/>
-              <a:t>2022-07-01</a:t>
+              <a:t>2022-07-16</a:t>
             </a:fld>
             <a:endParaRPr lang="ko-KR" altLang="en-US"/>
           </a:p>
@@ -1603,7 +1609,7 @@
           <a:p>
             <a:fld id="{ACA11FE2-C26E-405E-886C-CB2CCA1798DD}" type="datetimeFigureOut">
               <a:rPr lang="ko-KR" altLang="en-US" smtClean="0"/>
-              <a:t>2022-07-01</a:t>
+              <a:t>2022-07-16</a:t>
             </a:fld>
             <a:endParaRPr lang="ko-KR" altLang="en-US"/>
           </a:p>
@@ -1721,7 +1727,7 @@
           <a:p>
             <a:fld id="{ACA11FE2-C26E-405E-886C-CB2CCA1798DD}" type="datetimeFigureOut">
               <a:rPr lang="ko-KR" altLang="en-US" smtClean="0"/>
-              <a:t>2022-07-01</a:t>
+              <a:t>2022-07-16</a:t>
             </a:fld>
             <a:endParaRPr lang="ko-KR" altLang="en-US"/>
           </a:p>
@@ -1816,7 +1822,7 @@
           <a:p>
             <a:fld id="{ACA11FE2-C26E-405E-886C-CB2CCA1798DD}" type="datetimeFigureOut">
               <a:rPr lang="ko-KR" altLang="en-US" smtClean="0"/>
-              <a:t>2022-07-01</a:t>
+              <a:t>2022-07-16</a:t>
             </a:fld>
             <a:endParaRPr lang="ko-KR" altLang="en-US"/>
           </a:p>
@@ -2093,7 +2099,7 @@
           <a:p>
             <a:fld id="{ACA11FE2-C26E-405E-886C-CB2CCA1798DD}" type="datetimeFigureOut">
               <a:rPr lang="ko-KR" altLang="en-US" smtClean="0"/>
-              <a:t>2022-07-01</a:t>
+              <a:t>2022-07-16</a:t>
             </a:fld>
             <a:endParaRPr lang="ko-KR" altLang="en-US"/>
           </a:p>
@@ -2346,7 +2352,7 @@
           <a:p>
             <a:fld id="{ACA11FE2-C26E-405E-886C-CB2CCA1798DD}" type="datetimeFigureOut">
               <a:rPr lang="ko-KR" altLang="en-US" smtClean="0"/>
-              <a:t>2022-07-01</a:t>
+              <a:t>2022-07-16</a:t>
             </a:fld>
             <a:endParaRPr lang="ko-KR" altLang="en-US"/>
           </a:p>
@@ -2559,7 +2565,7 @@
           <a:p>
             <a:fld id="{ACA11FE2-C26E-405E-886C-CB2CCA1798DD}" type="datetimeFigureOut">
               <a:rPr lang="ko-KR" altLang="en-US" smtClean="0"/>
-              <a:t>2022-07-01</a:t>
+              <a:t>2022-07-16</a:t>
             </a:fld>
             <a:endParaRPr lang="ko-KR" altLang="en-US"/>
           </a:p>
@@ -3089,24 +3095,12 @@
               <a:rPr lang="en-US" altLang="ko-KR" dirty="0" smtClean="0"/>
               <a:t>Persistence</a:t>
             </a:r>
-            <a:r>
-              <a:rPr lang="en-US" altLang="ko-KR" dirty="0" smtClean="0"/>
-              <a:t/>
-            </a:r>
             <a:br>
               <a:rPr lang="en-US" altLang="ko-KR" dirty="0" smtClean="0"/>
             </a:br>
             <a:r>
               <a:rPr lang="en-US" altLang="ko-KR" dirty="0" smtClean="0"/>
-              <a:t>(</a:t>
-            </a:r>
-            <a:r>
-              <a:rPr lang="en-US" altLang="ko-KR" dirty="0" smtClean="0"/>
-              <a:t>Repository</a:t>
-            </a:r>
-            <a:r>
-              <a:rPr lang="en-US" altLang="ko-KR" dirty="0" smtClean="0"/>
-              <a:t>)</a:t>
+              <a:t>(Repository)</a:t>
             </a:r>
             <a:endParaRPr lang="ko-KR" altLang="en-US" dirty="0"/>
           </a:p>
@@ -3550,6 +3544,1022 @@
   <p:clrMapOvr>
     <a:masterClrMapping/>
   </p:clrMapOvr>
+</p:sld>
+</file>
+
+<file path=ppt/slides/slide2.xml><?xml version="1.0" encoding="utf-8"?>
+<p:sld xmlns:a="http://schemas.openxmlformats.org/drawingml/2006/main" xmlns:r="http://schemas.openxmlformats.org/officeDocument/2006/relationships" xmlns:p="http://schemas.openxmlformats.org/presentationml/2006/main">
+  <p:cSld>
+    <p:spTree>
+      <p:nvGrpSpPr>
+        <p:cNvPr id="1" name=""/>
+        <p:cNvGrpSpPr/>
+        <p:nvPr/>
+      </p:nvGrpSpPr>
+      <p:grpSpPr>
+        <a:xfrm>
+          <a:off x="0" y="0"/>
+          <a:ext cx="0" cy="0"/>
+          <a:chOff x="0" y="0"/>
+          <a:chExt cx="0" cy="0"/>
+        </a:xfrm>
+      </p:grpSpPr>
+      <p:sp>
+        <p:nvSpPr>
+          <p:cNvPr id="4" name="직사각형 3"/>
+          <p:cNvSpPr/>
+          <p:nvPr/>
+        </p:nvSpPr>
+        <p:spPr>
+          <a:xfrm>
+            <a:off x="1033272" y="987552"/>
+            <a:ext cx="1260000" cy="1440000"/>
+          </a:xfrm>
+          <a:prstGeom prst="rect">
+            <a:avLst/>
+          </a:prstGeom>
+          <a:noFill/>
+          <a:ln w="28575">
+            <a:solidFill>
+              <a:schemeClr val="accent5"/>
+            </a:solidFill>
+          </a:ln>
+        </p:spPr>
+        <p:style>
+          <a:lnRef idx="2">
+            <a:schemeClr val="accent1">
+              <a:shade val="50000"/>
+            </a:schemeClr>
+          </a:lnRef>
+          <a:fillRef idx="1">
+            <a:schemeClr val="accent1"/>
+          </a:fillRef>
+          <a:effectRef idx="0">
+            <a:schemeClr val="accent1"/>
+          </a:effectRef>
+          <a:fontRef idx="minor">
+            <a:schemeClr val="lt1"/>
+          </a:fontRef>
+        </p:style>
+        <p:txBody>
+          <a:bodyPr lIns="36000" tIns="36000" rIns="36000" bIns="36000" rtlCol="0" anchor="ctr"/>
+          <a:lstStyle/>
+          <a:p>
+            <a:pPr algn="ctr"/>
+            <a:r>
+              <a:rPr lang="ko-KR" altLang="en-US" dirty="0" smtClean="0">
+                <a:solidFill>
+                  <a:schemeClr val="tx1"/>
+                </a:solidFill>
+              </a:rPr>
+              <a:t>클라이언트</a:t>
+            </a:r>
+            <a:endParaRPr lang="ko-KR" altLang="en-US" dirty="0">
+              <a:solidFill>
+                <a:schemeClr val="tx1"/>
+              </a:solidFill>
+            </a:endParaRPr>
+          </a:p>
+        </p:txBody>
+      </p:sp>
+      <p:sp>
+        <p:nvSpPr>
+          <p:cNvPr id="5" name="직사각형 4"/>
+          <p:cNvSpPr/>
+          <p:nvPr/>
+        </p:nvSpPr>
+        <p:spPr>
+          <a:xfrm>
+            <a:off x="4736592" y="987552"/>
+            <a:ext cx="1260000" cy="1440000"/>
+          </a:xfrm>
+          <a:prstGeom prst="rect">
+            <a:avLst/>
+          </a:prstGeom>
+          <a:noFill/>
+          <a:ln w="28575">
+            <a:solidFill>
+              <a:schemeClr val="accent6"/>
+            </a:solidFill>
+          </a:ln>
+        </p:spPr>
+        <p:style>
+          <a:lnRef idx="2">
+            <a:schemeClr val="accent1">
+              <a:shade val="50000"/>
+            </a:schemeClr>
+          </a:lnRef>
+          <a:fillRef idx="1">
+            <a:schemeClr val="accent1"/>
+          </a:fillRef>
+          <a:effectRef idx="0">
+            <a:schemeClr val="accent1"/>
+          </a:effectRef>
+          <a:fontRef idx="minor">
+            <a:schemeClr val="lt1"/>
+          </a:fontRef>
+        </p:style>
+        <p:txBody>
+          <a:bodyPr lIns="36000" tIns="36000" rIns="36000" bIns="36000" rtlCol="0" anchor="ctr"/>
+          <a:lstStyle/>
+          <a:p>
+            <a:pPr algn="ctr"/>
+            <a:r>
+              <a:rPr lang="ko-KR" altLang="en-US" dirty="0" smtClean="0">
+                <a:solidFill>
+                  <a:schemeClr val="tx1"/>
+                </a:solidFill>
+              </a:rPr>
+              <a:t>서버</a:t>
+            </a:r>
+            <a:endParaRPr lang="ko-KR" altLang="en-US" dirty="0">
+              <a:solidFill>
+                <a:schemeClr val="tx1"/>
+              </a:solidFill>
+            </a:endParaRPr>
+          </a:p>
+        </p:txBody>
+      </p:sp>
+      <p:cxnSp>
+        <p:nvCxnSpPr>
+          <p:cNvPr id="7" name="직선 화살표 연결선 6"/>
+          <p:cNvCxnSpPr>
+            <a:stCxn id="4" idx="2"/>
+          </p:cNvCxnSpPr>
+          <p:nvPr/>
+        </p:nvCxnSpPr>
+        <p:spPr>
+          <a:xfrm>
+            <a:off x="1663272" y="2427552"/>
+            <a:ext cx="0" cy="3600000"/>
+          </a:xfrm>
+          <a:prstGeom prst="straightConnector1">
+            <a:avLst/>
+          </a:prstGeom>
+          <a:ln w="28575">
+            <a:solidFill>
+              <a:schemeClr val="accent5"/>
+            </a:solidFill>
+            <a:tailEnd type="triangle"/>
+          </a:ln>
+        </p:spPr>
+        <p:style>
+          <a:lnRef idx="1">
+            <a:schemeClr val="accent1"/>
+          </a:lnRef>
+          <a:fillRef idx="0">
+            <a:schemeClr val="accent1"/>
+          </a:fillRef>
+          <a:effectRef idx="0">
+            <a:schemeClr val="accent1"/>
+          </a:effectRef>
+          <a:fontRef idx="minor">
+            <a:schemeClr val="tx1"/>
+          </a:fontRef>
+        </p:style>
+      </p:cxnSp>
+      <p:cxnSp>
+        <p:nvCxnSpPr>
+          <p:cNvPr id="10" name="직선 화살표 연결선 9"/>
+          <p:cNvCxnSpPr>
+            <a:stCxn id="5" idx="2"/>
+          </p:cNvCxnSpPr>
+          <p:nvPr/>
+        </p:nvCxnSpPr>
+        <p:spPr>
+          <a:xfrm>
+            <a:off x="5366592" y="2427552"/>
+            <a:ext cx="0" cy="3600000"/>
+          </a:xfrm>
+          <a:prstGeom prst="straightConnector1">
+            <a:avLst/>
+          </a:prstGeom>
+          <a:ln w="28575">
+            <a:solidFill>
+              <a:schemeClr val="accent6"/>
+            </a:solidFill>
+            <a:tailEnd type="triangle"/>
+          </a:ln>
+        </p:spPr>
+        <p:style>
+          <a:lnRef idx="1">
+            <a:schemeClr val="accent1"/>
+          </a:lnRef>
+          <a:fillRef idx="0">
+            <a:schemeClr val="accent1"/>
+          </a:fillRef>
+          <a:effectRef idx="0">
+            <a:schemeClr val="accent1"/>
+          </a:effectRef>
+          <a:fontRef idx="minor">
+            <a:schemeClr val="tx1"/>
+          </a:fontRef>
+        </p:style>
+      </p:cxnSp>
+      <p:cxnSp>
+        <p:nvCxnSpPr>
+          <p:cNvPr id="12" name="직선 화살표 연결선 11"/>
+          <p:cNvCxnSpPr/>
+          <p:nvPr/>
+        </p:nvCxnSpPr>
+        <p:spPr>
+          <a:xfrm flipV="1">
+            <a:off x="1663272" y="3172968"/>
+            <a:ext cx="3703320" cy="0"/>
+          </a:xfrm>
+          <a:prstGeom prst="straightConnector1">
+            <a:avLst/>
+          </a:prstGeom>
+          <a:ln w="28575">
+            <a:solidFill>
+              <a:schemeClr val="accent5"/>
+            </a:solidFill>
+            <a:tailEnd type="triangle"/>
+          </a:ln>
+        </p:spPr>
+        <p:style>
+          <a:lnRef idx="1">
+            <a:schemeClr val="accent1"/>
+          </a:lnRef>
+          <a:fillRef idx="0">
+            <a:schemeClr val="accent1"/>
+          </a:fillRef>
+          <a:effectRef idx="0">
+            <a:schemeClr val="accent1"/>
+          </a:effectRef>
+          <a:fontRef idx="minor">
+            <a:schemeClr val="tx1"/>
+          </a:fontRef>
+        </p:style>
+      </p:cxnSp>
+      <p:cxnSp>
+        <p:nvCxnSpPr>
+          <p:cNvPr id="15" name="직선 화살표 연결선 14"/>
+          <p:cNvCxnSpPr/>
+          <p:nvPr/>
+        </p:nvCxnSpPr>
+        <p:spPr>
+          <a:xfrm flipH="1" flipV="1">
+            <a:off x="1663272" y="3922776"/>
+            <a:ext cx="3703320" cy="0"/>
+          </a:xfrm>
+          <a:prstGeom prst="straightConnector1">
+            <a:avLst/>
+          </a:prstGeom>
+          <a:ln w="28575">
+            <a:solidFill>
+              <a:schemeClr val="accent6"/>
+            </a:solidFill>
+            <a:tailEnd type="triangle"/>
+          </a:ln>
+        </p:spPr>
+        <p:style>
+          <a:lnRef idx="1">
+            <a:schemeClr val="accent1"/>
+          </a:lnRef>
+          <a:fillRef idx="0">
+            <a:schemeClr val="accent1"/>
+          </a:fillRef>
+          <a:effectRef idx="0">
+            <a:schemeClr val="accent1"/>
+          </a:effectRef>
+          <a:fontRef idx="minor">
+            <a:schemeClr val="tx1"/>
+          </a:fontRef>
+        </p:style>
+      </p:cxnSp>
+      <p:cxnSp>
+        <p:nvCxnSpPr>
+          <p:cNvPr id="16" name="직선 화살표 연결선 15"/>
+          <p:cNvCxnSpPr/>
+          <p:nvPr/>
+        </p:nvCxnSpPr>
+        <p:spPr>
+          <a:xfrm flipV="1">
+            <a:off x="1663272" y="4727448"/>
+            <a:ext cx="3703320" cy="0"/>
+          </a:xfrm>
+          <a:prstGeom prst="straightConnector1">
+            <a:avLst/>
+          </a:prstGeom>
+          <a:ln w="28575">
+            <a:solidFill>
+              <a:schemeClr val="accent5"/>
+            </a:solidFill>
+            <a:tailEnd type="triangle"/>
+          </a:ln>
+        </p:spPr>
+        <p:style>
+          <a:lnRef idx="1">
+            <a:schemeClr val="accent1"/>
+          </a:lnRef>
+          <a:fillRef idx="0">
+            <a:schemeClr val="accent1"/>
+          </a:fillRef>
+          <a:effectRef idx="0">
+            <a:schemeClr val="accent1"/>
+          </a:effectRef>
+          <a:fontRef idx="minor">
+            <a:schemeClr val="tx1"/>
+          </a:fontRef>
+        </p:style>
+      </p:cxnSp>
+      <p:cxnSp>
+        <p:nvCxnSpPr>
+          <p:cNvPr id="17" name="직선 화살표 연결선 16"/>
+          <p:cNvCxnSpPr/>
+          <p:nvPr/>
+        </p:nvCxnSpPr>
+        <p:spPr>
+          <a:xfrm flipH="1" flipV="1">
+            <a:off x="1663272" y="5477256"/>
+            <a:ext cx="3703320" cy="0"/>
+          </a:xfrm>
+          <a:prstGeom prst="straightConnector1">
+            <a:avLst/>
+          </a:prstGeom>
+          <a:ln w="28575">
+            <a:solidFill>
+              <a:schemeClr val="accent6"/>
+            </a:solidFill>
+            <a:tailEnd type="triangle"/>
+          </a:ln>
+        </p:spPr>
+        <p:style>
+          <a:lnRef idx="1">
+            <a:schemeClr val="accent1"/>
+          </a:lnRef>
+          <a:fillRef idx="0">
+            <a:schemeClr val="accent1"/>
+          </a:fillRef>
+          <a:effectRef idx="0">
+            <a:schemeClr val="accent1"/>
+          </a:effectRef>
+          <a:fontRef idx="minor">
+            <a:schemeClr val="tx1"/>
+          </a:fontRef>
+        </p:style>
+      </p:cxnSp>
+      <p:sp>
+        <p:nvSpPr>
+          <p:cNvPr id="18" name="TextBox 17"/>
+          <p:cNvSpPr txBox="1"/>
+          <p:nvPr/>
+        </p:nvSpPr>
+        <p:spPr>
+          <a:xfrm>
+            <a:off x="2742264" y="2810328"/>
+            <a:ext cx="1545336" cy="307777"/>
+          </a:xfrm>
+          <a:prstGeom prst="rect">
+            <a:avLst/>
+          </a:prstGeom>
+          <a:noFill/>
+        </p:spPr>
+        <p:txBody>
+          <a:bodyPr wrap="square" rtlCol="0">
+            <a:spAutoFit/>
+          </a:bodyPr>
+          <a:lstStyle/>
+          <a:p>
+            <a:pPr algn="ctr"/>
+            <a:r>
+              <a:rPr lang="ko-KR" altLang="en-US" sz="1400" b="1" dirty="0" smtClean="0"/>
+              <a:t>로그인</a:t>
+            </a:r>
+            <a:endParaRPr lang="ko-KR" altLang="en-US" sz="1400" b="1" dirty="0"/>
+          </a:p>
+        </p:txBody>
+      </p:sp>
+      <p:sp>
+        <p:nvSpPr>
+          <p:cNvPr id="19" name="TextBox 18"/>
+          <p:cNvSpPr txBox="1"/>
+          <p:nvPr/>
+        </p:nvSpPr>
+        <p:spPr>
+          <a:xfrm>
+            <a:off x="2742264" y="3555744"/>
+            <a:ext cx="1545336" cy="307777"/>
+          </a:xfrm>
+          <a:prstGeom prst="rect">
+            <a:avLst/>
+          </a:prstGeom>
+          <a:noFill/>
+        </p:spPr>
+        <p:txBody>
+          <a:bodyPr wrap="square" rtlCol="0">
+            <a:spAutoFit/>
+          </a:bodyPr>
+          <a:lstStyle/>
+          <a:p>
+            <a:pPr algn="ctr"/>
+            <a:r>
+              <a:rPr lang="en-US" altLang="ko-KR" sz="1400" b="1" dirty="0" smtClean="0"/>
+              <a:t>&lt;TOKEN&gt; </a:t>
+            </a:r>
+            <a:r>
+              <a:rPr lang="ko-KR" altLang="en-US" sz="1400" b="1" dirty="0" smtClean="0"/>
+              <a:t>반환</a:t>
+            </a:r>
+            <a:endParaRPr lang="ko-KR" altLang="en-US" sz="1400" b="1" dirty="0"/>
+          </a:p>
+        </p:txBody>
+      </p:sp>
+      <p:sp>
+        <p:nvSpPr>
+          <p:cNvPr id="20" name="TextBox 19"/>
+          <p:cNvSpPr txBox="1"/>
+          <p:nvPr/>
+        </p:nvSpPr>
+        <p:spPr>
+          <a:xfrm>
+            <a:off x="1663273" y="4144972"/>
+            <a:ext cx="3703318" cy="523220"/>
+          </a:xfrm>
+          <a:prstGeom prst="rect">
+            <a:avLst/>
+          </a:prstGeom>
+          <a:noFill/>
+        </p:spPr>
+        <p:txBody>
+          <a:bodyPr wrap="square" rtlCol="0">
+            <a:spAutoFit/>
+          </a:bodyPr>
+          <a:lstStyle/>
+          <a:p>
+            <a:pPr algn="ctr"/>
+            <a:r>
+              <a:rPr lang="en-US" altLang="ko-KR" sz="1400" b="1" dirty="0" smtClean="0"/>
+              <a:t>HTTP Request</a:t>
+            </a:r>
+            <a:br>
+              <a:rPr lang="en-US" altLang="ko-KR" sz="1400" b="1" dirty="0" smtClean="0"/>
+            </a:br>
+            <a:r>
+              <a:rPr lang="en-US" altLang="ko-KR" sz="1400" b="1" dirty="0" smtClean="0"/>
+              <a:t>Authorization: Bearer &lt;TOKEN&gt;</a:t>
+            </a:r>
+            <a:endParaRPr lang="ko-KR" altLang="en-US" sz="1400" b="1" dirty="0"/>
+          </a:p>
+        </p:txBody>
+      </p:sp>
+      <p:sp>
+        <p:nvSpPr>
+          <p:cNvPr id="21" name="TextBox 20"/>
+          <p:cNvSpPr txBox="1"/>
+          <p:nvPr/>
+        </p:nvSpPr>
+        <p:spPr>
+          <a:xfrm>
+            <a:off x="2028096" y="5110222"/>
+            <a:ext cx="2973672" cy="307777"/>
+          </a:xfrm>
+          <a:prstGeom prst="rect">
+            <a:avLst/>
+          </a:prstGeom>
+          <a:noFill/>
+        </p:spPr>
+        <p:txBody>
+          <a:bodyPr wrap="square" rtlCol="0">
+            <a:spAutoFit/>
+          </a:bodyPr>
+          <a:lstStyle/>
+          <a:p>
+            <a:pPr algn="ctr"/>
+            <a:r>
+              <a:rPr lang="ko-KR" altLang="en-US" sz="1400" b="1" dirty="0" smtClean="0"/>
+              <a:t>로그인 </a:t>
+            </a:r>
+            <a:r>
+              <a:rPr lang="ko-KR" altLang="en-US" sz="1400" b="1" smtClean="0"/>
+              <a:t>상태이므로 리소스 반환</a:t>
+            </a:r>
+            <a:endParaRPr lang="ko-KR" altLang="en-US" sz="1400" b="1" dirty="0"/>
+          </a:p>
+        </p:txBody>
+      </p:sp>
+      <p:sp>
+        <p:nvSpPr>
+          <p:cNvPr id="22" name="TextBox 21"/>
+          <p:cNvSpPr txBox="1"/>
+          <p:nvPr/>
+        </p:nvSpPr>
+        <p:spPr>
+          <a:xfrm>
+            <a:off x="5641848" y="2852280"/>
+            <a:ext cx="4370832" cy="738664"/>
+          </a:xfrm>
+          <a:prstGeom prst="rect">
+            <a:avLst/>
+          </a:prstGeom>
+          <a:noFill/>
+        </p:spPr>
+        <p:txBody>
+          <a:bodyPr wrap="square" rtlCol="0">
+            <a:spAutoFit/>
+          </a:bodyPr>
+          <a:lstStyle/>
+          <a:p>
+            <a:r>
+              <a:rPr lang="ko-KR" altLang="en-US" sz="1400" b="1" dirty="0" smtClean="0"/>
+              <a:t>사용자 정보를 바탕으로 </a:t>
+            </a:r>
+            <a:r>
+              <a:rPr lang="en-US" altLang="ko-KR" sz="1400" b="1" dirty="0" smtClean="0">
+                <a:solidFill>
+                  <a:srgbClr val="FF0000"/>
+                </a:solidFill>
+              </a:rPr>
+              <a:t>{</a:t>
+            </a:r>
+            <a:r>
+              <a:rPr lang="ko-KR" altLang="en-US" sz="1400" b="1" dirty="0" smtClean="0">
+                <a:solidFill>
+                  <a:srgbClr val="FF0000"/>
+                </a:solidFill>
+              </a:rPr>
+              <a:t>헤더</a:t>
+            </a:r>
+            <a:r>
+              <a:rPr lang="en-US" altLang="ko-KR" sz="1400" b="1" dirty="0" smtClean="0">
+                <a:solidFill>
+                  <a:srgbClr val="FF0000"/>
+                </a:solidFill>
+              </a:rPr>
+              <a:t>}.{</a:t>
+            </a:r>
+            <a:r>
+              <a:rPr lang="ko-KR" altLang="en-US" sz="1400" b="1" dirty="0" smtClean="0">
+                <a:solidFill>
+                  <a:srgbClr val="FF0000"/>
+                </a:solidFill>
+              </a:rPr>
+              <a:t>페이로드</a:t>
+            </a:r>
+            <a:r>
+              <a:rPr lang="en-US" altLang="ko-KR" sz="1400" b="1" dirty="0" smtClean="0">
+                <a:solidFill>
+                  <a:srgbClr val="FF0000"/>
+                </a:solidFill>
+              </a:rPr>
+              <a:t>} </a:t>
+            </a:r>
+            <a:r>
+              <a:rPr lang="ko-KR" altLang="en-US" sz="1400" b="1" dirty="0" smtClean="0"/>
+              <a:t>작성</a:t>
+            </a:r>
+            <a:r>
+              <a:rPr lang="en-US" altLang="ko-KR" sz="1400" b="1" dirty="0" smtClean="0"/>
+              <a:t/>
+            </a:r>
+            <a:br>
+              <a:rPr lang="en-US" altLang="ko-KR" sz="1400" b="1" dirty="0" smtClean="0"/>
+            </a:br>
+            <a:r>
+              <a:rPr lang="ko-KR" altLang="en-US" sz="1400" b="1" dirty="0" smtClean="0"/>
+              <a:t>생성된 </a:t>
+            </a:r>
+            <a:r>
+              <a:rPr lang="en-US" altLang="ko-KR" sz="1400" b="1" dirty="0" smtClean="0">
+                <a:solidFill>
+                  <a:srgbClr val="FF0000"/>
+                </a:solidFill>
+              </a:rPr>
+              <a:t>{</a:t>
+            </a:r>
+            <a:r>
+              <a:rPr lang="ko-KR" altLang="en-US" sz="1400" b="1" dirty="0" smtClean="0">
+                <a:solidFill>
+                  <a:srgbClr val="FF0000"/>
+                </a:solidFill>
+              </a:rPr>
+              <a:t>헤더</a:t>
+            </a:r>
+            <a:r>
+              <a:rPr lang="en-US" altLang="ko-KR" sz="1400" b="1" dirty="0" smtClean="0">
+                <a:solidFill>
+                  <a:srgbClr val="FF0000"/>
+                </a:solidFill>
+              </a:rPr>
+              <a:t>}.{</a:t>
+            </a:r>
+            <a:r>
+              <a:rPr lang="ko-KR" altLang="en-US" sz="1400" b="1" dirty="0" smtClean="0">
+                <a:solidFill>
+                  <a:srgbClr val="FF0000"/>
+                </a:solidFill>
+              </a:rPr>
+              <a:t>페이로드</a:t>
+            </a:r>
+            <a:r>
+              <a:rPr lang="en-US" altLang="ko-KR" sz="1400" b="1" dirty="0" smtClean="0">
+                <a:solidFill>
+                  <a:srgbClr val="FF0000"/>
+                </a:solidFill>
+              </a:rPr>
+              <a:t>}</a:t>
+            </a:r>
+            <a:r>
+              <a:rPr lang="ko-KR" altLang="en-US" sz="1400" b="1" dirty="0" smtClean="0"/>
+              <a:t>를</a:t>
+            </a:r>
+            <a:r>
+              <a:rPr lang="en-US" altLang="ko-KR" sz="1400" b="1" dirty="0"/>
+              <a:t> </a:t>
+            </a:r>
+            <a:r>
+              <a:rPr lang="ko-KR" altLang="en-US" sz="1400" b="1" dirty="0" smtClean="0"/>
+              <a:t>비밀키로 하여 전자서명 </a:t>
+            </a:r>
+            <a:r>
+              <a:rPr lang="en-US" altLang="ko-KR" sz="1400" b="1" dirty="0" smtClean="0"/>
+              <a:t>=&gt; </a:t>
+            </a:r>
+            <a:r>
+              <a:rPr lang="ko-KR" altLang="en-US" sz="1400" b="1" dirty="0" smtClean="0"/>
+              <a:t>결과 </a:t>
+            </a:r>
+            <a:r>
+              <a:rPr lang="en-US" altLang="ko-KR" sz="1400" b="1" dirty="0" smtClean="0">
+                <a:solidFill>
+                  <a:srgbClr val="FF0000"/>
+                </a:solidFill>
+              </a:rPr>
+              <a:t>{</a:t>
+            </a:r>
+            <a:r>
+              <a:rPr lang="ko-KR" altLang="en-US" sz="1400" b="1" dirty="0" smtClean="0">
+                <a:solidFill>
+                  <a:srgbClr val="FF0000"/>
+                </a:solidFill>
+              </a:rPr>
+              <a:t>전자서명 </a:t>
+            </a:r>
+            <a:r>
+              <a:rPr lang="en-US" altLang="ko-KR" sz="1400" b="1" dirty="0" smtClean="0">
+                <a:solidFill>
+                  <a:srgbClr val="FF0000"/>
+                </a:solidFill>
+              </a:rPr>
+              <a:t>X}</a:t>
+            </a:r>
+            <a:endParaRPr lang="ko-KR" altLang="en-US" sz="1400" b="1" dirty="0">
+              <a:solidFill>
+                <a:srgbClr val="FF0000"/>
+              </a:solidFill>
+            </a:endParaRPr>
+          </a:p>
+        </p:txBody>
+      </p:sp>
+      <p:sp>
+        <p:nvSpPr>
+          <p:cNvPr id="25" name="TextBox 24"/>
+          <p:cNvSpPr txBox="1"/>
+          <p:nvPr/>
+        </p:nvSpPr>
+        <p:spPr>
+          <a:xfrm>
+            <a:off x="5641848" y="4371558"/>
+            <a:ext cx="4370832" cy="1600438"/>
+          </a:xfrm>
+          <a:prstGeom prst="rect">
+            <a:avLst/>
+          </a:prstGeom>
+          <a:noFill/>
+        </p:spPr>
+        <p:txBody>
+          <a:bodyPr wrap="square" rtlCol="0">
+            <a:spAutoFit/>
+          </a:bodyPr>
+          <a:lstStyle/>
+          <a:p>
+            <a:r>
+              <a:rPr lang="ko-KR" altLang="en-US" sz="1400" b="1" dirty="0" smtClean="0"/>
+              <a:t>사용자에게서 받은 </a:t>
+            </a:r>
+            <a:r>
+              <a:rPr lang="en-US" altLang="ko-KR" sz="1400" b="1" dirty="0" smtClean="0"/>
+              <a:t>&lt;</a:t>
+            </a:r>
+            <a:r>
+              <a:rPr lang="ko-KR" altLang="en-US" sz="1400" b="1" dirty="0" smtClean="0"/>
+              <a:t>토큰</a:t>
+            </a:r>
+            <a:r>
+              <a:rPr lang="en-US" altLang="ko-KR" sz="1400" b="1" dirty="0" smtClean="0"/>
+              <a:t>&gt;</a:t>
+            </a:r>
+            <a:r>
+              <a:rPr lang="ko-KR" altLang="en-US" sz="1400" b="1" dirty="0" smtClean="0"/>
+              <a:t>을 </a:t>
+            </a:r>
+            <a:r>
+              <a:rPr lang="en-US" altLang="ko-KR" sz="1400" b="1" dirty="0" smtClean="0"/>
+              <a:t>Base64</a:t>
+            </a:r>
+            <a:r>
+              <a:rPr lang="ko-KR" altLang="en-US" sz="1400" b="1" dirty="0" smtClean="0"/>
+              <a:t>로 </a:t>
+            </a:r>
+            <a:r>
+              <a:rPr lang="ko-KR" altLang="en-US" sz="1400" b="1" dirty="0" err="1" smtClean="0"/>
+              <a:t>디코딩</a:t>
+            </a:r>
+            <a:r>
+              <a:rPr lang="en-US" altLang="ko-KR" sz="1400" b="1" dirty="0" smtClean="0"/>
+              <a:t/>
+            </a:r>
+            <a:br>
+              <a:rPr lang="en-US" altLang="ko-KR" sz="1400" b="1" dirty="0" smtClean="0"/>
+            </a:br>
+            <a:r>
+              <a:rPr lang="ko-KR" altLang="en-US" sz="1400" b="1" dirty="0" smtClean="0"/>
+              <a:t>결과 </a:t>
+            </a:r>
+            <a:r>
+              <a:rPr lang="en-US" altLang="ko-KR" sz="1400" b="1" dirty="0" smtClean="0"/>
+              <a:t>=&gt; </a:t>
+            </a:r>
+            <a:r>
+              <a:rPr lang="en-US" altLang="ko-KR" sz="1400" b="1" dirty="0" smtClean="0">
+                <a:solidFill>
+                  <a:srgbClr val="FF0000"/>
+                </a:solidFill>
+              </a:rPr>
+              <a:t>{</a:t>
+            </a:r>
+            <a:r>
+              <a:rPr lang="ko-KR" altLang="en-US" sz="1400" b="1" dirty="0" smtClean="0">
+                <a:solidFill>
+                  <a:srgbClr val="FF0000"/>
+                </a:solidFill>
+              </a:rPr>
+              <a:t>헤더</a:t>
+            </a:r>
+            <a:r>
+              <a:rPr lang="en-US" altLang="ko-KR" sz="1400" b="1" dirty="0" smtClean="0">
+                <a:solidFill>
+                  <a:srgbClr val="FF0000"/>
+                </a:solidFill>
+              </a:rPr>
+              <a:t>}.{</a:t>
+            </a:r>
+            <a:r>
+              <a:rPr lang="ko-KR" altLang="en-US" sz="1400" b="1" dirty="0" smtClean="0">
+                <a:solidFill>
+                  <a:srgbClr val="FF0000"/>
+                </a:solidFill>
+              </a:rPr>
+              <a:t>페이로드</a:t>
+            </a:r>
+            <a:r>
+              <a:rPr lang="en-US" altLang="ko-KR" sz="1400" b="1" dirty="0" smtClean="0">
+                <a:solidFill>
+                  <a:srgbClr val="FF0000"/>
+                </a:solidFill>
+              </a:rPr>
+              <a:t>}.{</a:t>
+            </a:r>
+            <a:r>
+              <a:rPr lang="ko-KR" altLang="en-US" sz="1400" b="1" dirty="0" smtClean="0">
+                <a:solidFill>
+                  <a:srgbClr val="FF0000"/>
+                </a:solidFill>
+              </a:rPr>
+              <a:t>전자서명 </a:t>
+            </a:r>
+            <a:r>
+              <a:rPr lang="en-US" altLang="ko-KR" sz="1400" b="1" dirty="0" smtClean="0">
+                <a:solidFill>
+                  <a:srgbClr val="FF0000"/>
+                </a:solidFill>
+              </a:rPr>
+              <a:t>X}</a:t>
+            </a:r>
+          </a:p>
+          <a:p>
+            <a:r>
+              <a:rPr lang="en-US" altLang="ko-KR" sz="1400" b="1" dirty="0" smtClean="0">
+                <a:solidFill>
+                  <a:srgbClr val="FF0000"/>
+                </a:solidFill>
+              </a:rPr>
+              <a:t>{</a:t>
+            </a:r>
+            <a:r>
+              <a:rPr lang="ko-KR" altLang="en-US" sz="1400" b="1" dirty="0" smtClean="0">
+                <a:solidFill>
+                  <a:srgbClr val="FF0000"/>
+                </a:solidFill>
+              </a:rPr>
+              <a:t>헤더</a:t>
+            </a:r>
+            <a:r>
+              <a:rPr lang="en-US" altLang="ko-KR" sz="1400" b="1" dirty="0" smtClean="0">
+                <a:solidFill>
+                  <a:srgbClr val="FF0000"/>
+                </a:solidFill>
+              </a:rPr>
+              <a:t>}.{</a:t>
+            </a:r>
+            <a:r>
+              <a:rPr lang="ko-KR" altLang="en-US" sz="1400" b="1" dirty="0" smtClean="0">
+                <a:solidFill>
+                  <a:srgbClr val="FF0000"/>
+                </a:solidFill>
+              </a:rPr>
+              <a:t>페이로드</a:t>
+            </a:r>
+            <a:r>
+              <a:rPr lang="en-US" altLang="ko-KR" sz="1400" b="1" dirty="0" smtClean="0">
+                <a:solidFill>
+                  <a:srgbClr val="FF0000"/>
+                </a:solidFill>
+              </a:rPr>
+              <a:t>}</a:t>
+            </a:r>
+            <a:r>
+              <a:rPr lang="ko-KR" altLang="en-US" sz="1400" b="1" dirty="0" smtClean="0"/>
+              <a:t>를 </a:t>
+            </a:r>
+            <a:r>
+              <a:rPr lang="ko-KR" altLang="en-US" sz="1400" b="1" dirty="0" err="1" smtClean="0"/>
+              <a:t>비밀키로하여</a:t>
+            </a:r>
+            <a:r>
+              <a:rPr lang="ko-KR" altLang="en-US" sz="1400" b="1" dirty="0" smtClean="0"/>
+              <a:t> 전자서명</a:t>
+            </a:r>
+            <a:r>
+              <a:rPr lang="en-US" altLang="ko-KR" sz="1400" b="1" dirty="0" smtClean="0"/>
+              <a:t/>
+            </a:r>
+            <a:br>
+              <a:rPr lang="en-US" altLang="ko-KR" sz="1400" b="1" dirty="0" smtClean="0"/>
+            </a:br>
+            <a:r>
+              <a:rPr lang="en-US" altLang="ko-KR" sz="1400" b="1" dirty="0" smtClean="0"/>
+              <a:t>=&gt; </a:t>
+            </a:r>
+            <a:r>
+              <a:rPr lang="ko-KR" altLang="en-US" sz="1400" b="1" dirty="0" smtClean="0"/>
+              <a:t>결과 </a:t>
+            </a:r>
+            <a:r>
+              <a:rPr lang="en-US" altLang="ko-KR" sz="1400" b="1" dirty="0" smtClean="0">
+                <a:solidFill>
+                  <a:schemeClr val="accent5"/>
+                </a:solidFill>
+              </a:rPr>
+              <a:t>{</a:t>
+            </a:r>
+            <a:r>
+              <a:rPr lang="ko-KR" altLang="en-US" sz="1400" b="1" dirty="0" smtClean="0">
+                <a:solidFill>
+                  <a:schemeClr val="accent5"/>
+                </a:solidFill>
+              </a:rPr>
+              <a:t>전자서명 </a:t>
+            </a:r>
+            <a:r>
+              <a:rPr lang="en-US" altLang="ko-KR" sz="1400" b="1" dirty="0" smtClean="0">
+                <a:solidFill>
+                  <a:schemeClr val="accent5"/>
+                </a:solidFill>
+              </a:rPr>
+              <a:t>Y}</a:t>
+            </a:r>
+            <a:r>
+              <a:rPr lang="en-US" altLang="ko-KR" sz="1400" b="1" dirty="0" smtClean="0"/>
+              <a:t/>
+            </a:r>
+            <a:br>
+              <a:rPr lang="en-US" altLang="ko-KR" sz="1400" b="1" dirty="0" smtClean="0"/>
+            </a:br>
+            <a:r>
+              <a:rPr lang="ko-KR" altLang="en-US" sz="1400" b="1" dirty="0" err="1" smtClean="0">
+                <a:solidFill>
+                  <a:srgbClr val="7030A0"/>
+                </a:solidFill>
+              </a:rPr>
+              <a:t>디코딩된</a:t>
+            </a:r>
+            <a:r>
+              <a:rPr lang="ko-KR" altLang="en-US" sz="1400" b="1" dirty="0" smtClean="0">
+                <a:solidFill>
+                  <a:srgbClr val="7030A0"/>
+                </a:solidFill>
+              </a:rPr>
+              <a:t> 토큰의 마지막 부분 </a:t>
+            </a:r>
+            <a:r>
+              <a:rPr lang="en-US" altLang="ko-KR" sz="1400" b="1" dirty="0" smtClean="0">
+                <a:solidFill>
+                  <a:srgbClr val="7030A0"/>
+                </a:solidFill>
+              </a:rPr>
+              <a:t>X</a:t>
+            </a:r>
+            <a:r>
+              <a:rPr lang="ko-KR" altLang="en-US" sz="1400" b="1" dirty="0" smtClean="0">
+                <a:solidFill>
+                  <a:srgbClr val="7030A0"/>
+                </a:solidFill>
+              </a:rPr>
+              <a:t>와 방금 전자서명 한 </a:t>
+            </a:r>
+            <a:r>
+              <a:rPr lang="en-US" altLang="ko-KR" sz="1400" b="1" dirty="0" smtClean="0">
+                <a:solidFill>
+                  <a:srgbClr val="7030A0"/>
+                </a:solidFill>
+              </a:rPr>
+              <a:t>Y</a:t>
+            </a:r>
+            <a:r>
+              <a:rPr lang="ko-KR" altLang="en-US" sz="1400" b="1" dirty="0" smtClean="0">
+                <a:solidFill>
+                  <a:srgbClr val="7030A0"/>
+                </a:solidFill>
+              </a:rPr>
+              <a:t>를 비교 </a:t>
+            </a:r>
+            <a:r>
+              <a:rPr lang="en-US" altLang="ko-KR" sz="1400" b="1" dirty="0" smtClean="0">
+                <a:solidFill>
+                  <a:srgbClr val="7030A0"/>
+                </a:solidFill>
+              </a:rPr>
+              <a:t>=&gt; X == Y</a:t>
+            </a:r>
+            <a:r>
+              <a:rPr lang="ko-KR" altLang="en-US" sz="1400" b="1" dirty="0" smtClean="0">
+                <a:solidFill>
+                  <a:srgbClr val="7030A0"/>
+                </a:solidFill>
+              </a:rPr>
+              <a:t>일 경우 서명이 일치하므로 검증 완료</a:t>
+            </a:r>
+            <a:endParaRPr lang="ko-KR" altLang="en-US" sz="1400" b="1" dirty="0">
+              <a:solidFill>
+                <a:srgbClr val="7030A0"/>
+              </a:solidFill>
+            </a:endParaRPr>
+          </a:p>
+        </p:txBody>
+      </p:sp>
+      <p:sp>
+        <p:nvSpPr>
+          <p:cNvPr id="26" name="TextBox 25"/>
+          <p:cNvSpPr txBox="1"/>
+          <p:nvPr/>
+        </p:nvSpPr>
+        <p:spPr>
+          <a:xfrm>
+            <a:off x="757080" y="393192"/>
+            <a:ext cx="3072384" cy="338554"/>
+          </a:xfrm>
+          <a:prstGeom prst="rect">
+            <a:avLst/>
+          </a:prstGeom>
+          <a:noFill/>
+        </p:spPr>
+        <p:txBody>
+          <a:bodyPr wrap="square" rtlCol="0">
+            <a:spAutoFit/>
+          </a:bodyPr>
+          <a:lstStyle/>
+          <a:p>
+            <a:r>
+              <a:rPr lang="en-US" altLang="ko-KR" sz="1600" b="1" dirty="0" smtClean="0"/>
+              <a:t>JWT </a:t>
+            </a:r>
+            <a:r>
+              <a:rPr lang="ko-KR" altLang="en-US" sz="1600" b="1" dirty="0" smtClean="0"/>
+              <a:t>토큰 생성과 인증 과정</a:t>
+            </a:r>
+            <a:endParaRPr lang="ko-KR" altLang="en-US" sz="1600" b="1" dirty="0"/>
+          </a:p>
+        </p:txBody>
+      </p:sp>
+    </p:spTree>
+    <p:extLst>
+      <p:ext uri="{BB962C8B-B14F-4D97-AF65-F5344CB8AC3E}">
+        <p14:creationId xmlns:p14="http://schemas.microsoft.com/office/powerpoint/2010/main" val="728158850"/>
+      </p:ext>
+    </p:extLst>
+  </p:cSld>
+  <p:clrMapOvr>
+    <a:masterClrMapping/>
+  </p:clrMapOvr>
+  <p:timing>
+    <p:tnLst>
+      <p:par>
+        <p:cTn id="1" dur="indefinite" restart="never" nodeType="tmRoot"/>
+      </p:par>
+    </p:tnLst>
+  </p:timing>
 </p:sld>
 </file>
 

</xml_diff>